<commit_message>
now good basic state
</commit_message>
<xml_diff>
--- a/peer-reviews/peer-review-1.pptx
+++ b/peer-reviews/peer-review-1.pptx
@@ -112,6 +112,11 @@
       </a:defRPr>
     </a:lvl9pPr>
   </p:defaultTextStyle>
+  <p:extLst>
+    <p:ext uri="{EFAFB233-063F-42B5-8137-9DF3F51BA10A}">
+      <p15:sldGuideLst xmlns:p15="http://schemas.microsoft.com/office/powerpoint/2012/main"/>
+    </p:ext>
+  </p:extLst>
 </p:presentation>
 </file>
 
@@ -197,7 +202,7 @@
           <a:p>
             <a:fld id="{69FDE79F-F5FE-3A44-AC3E-E4269C5DBFCF}" type="datetimeFigureOut">
               <a:rPr lang="en-US" smtClean="0"/>
-              <a:t>3/21/17</a:t>
+              <a:t>4/4/17</a:t>
             </a:fld>
             <a:endParaRPr lang="en-US"/>
           </a:p>
@@ -596,7 +601,7 @@
           <a:p>
             <a:fld id="{4BAB36A4-D2A7-4048-8DB1-F0177A6C4AAA}" type="datetimeFigureOut">
               <a:rPr lang="en-US" smtClean="0"/>
-              <a:t>3/21/17</a:t>
+              <a:t>4/4/17</a:t>
             </a:fld>
             <a:endParaRPr lang="en-US"/>
           </a:p>
@@ -766,7 +771,7 @@
           <a:p>
             <a:fld id="{4BAB36A4-D2A7-4048-8DB1-F0177A6C4AAA}" type="datetimeFigureOut">
               <a:rPr lang="en-US" smtClean="0"/>
-              <a:t>3/21/17</a:t>
+              <a:t>4/4/17</a:t>
             </a:fld>
             <a:endParaRPr lang="en-US"/>
           </a:p>
@@ -946,7 +951,7 @@
           <a:p>
             <a:fld id="{4BAB36A4-D2A7-4048-8DB1-F0177A6C4AAA}" type="datetimeFigureOut">
               <a:rPr lang="en-US" smtClean="0"/>
-              <a:t>3/21/17</a:t>
+              <a:t>4/4/17</a:t>
             </a:fld>
             <a:endParaRPr lang="en-US"/>
           </a:p>
@@ -1116,7 +1121,7 @@
           <a:p>
             <a:fld id="{4BAB36A4-D2A7-4048-8DB1-F0177A6C4AAA}" type="datetimeFigureOut">
               <a:rPr lang="en-US" smtClean="0"/>
-              <a:t>3/21/17</a:t>
+              <a:t>4/4/17</a:t>
             </a:fld>
             <a:endParaRPr lang="en-US"/>
           </a:p>
@@ -1362,7 +1367,7 @@
           <a:p>
             <a:fld id="{4BAB36A4-D2A7-4048-8DB1-F0177A6C4AAA}" type="datetimeFigureOut">
               <a:rPr lang="en-US" smtClean="0"/>
-              <a:t>3/21/17</a:t>
+              <a:t>4/4/17</a:t>
             </a:fld>
             <a:endParaRPr lang="en-US"/>
           </a:p>
@@ -1594,7 +1599,7 @@
           <a:p>
             <a:fld id="{4BAB36A4-D2A7-4048-8DB1-F0177A6C4AAA}" type="datetimeFigureOut">
               <a:rPr lang="en-US" smtClean="0"/>
-              <a:t>3/21/17</a:t>
+              <a:t>4/4/17</a:t>
             </a:fld>
             <a:endParaRPr lang="en-US"/>
           </a:p>
@@ -1961,7 +1966,7 @@
           <a:p>
             <a:fld id="{4BAB36A4-D2A7-4048-8DB1-F0177A6C4AAA}" type="datetimeFigureOut">
               <a:rPr lang="en-US" smtClean="0"/>
-              <a:t>3/21/17</a:t>
+              <a:t>4/4/17</a:t>
             </a:fld>
             <a:endParaRPr lang="en-US"/>
           </a:p>
@@ -2079,7 +2084,7 @@
           <a:p>
             <a:fld id="{4BAB36A4-D2A7-4048-8DB1-F0177A6C4AAA}" type="datetimeFigureOut">
               <a:rPr lang="en-US" smtClean="0"/>
-              <a:t>3/21/17</a:t>
+              <a:t>4/4/17</a:t>
             </a:fld>
             <a:endParaRPr lang="en-US"/>
           </a:p>
@@ -2174,7 +2179,7 @@
           <a:p>
             <a:fld id="{4BAB36A4-D2A7-4048-8DB1-F0177A6C4AAA}" type="datetimeFigureOut">
               <a:rPr lang="en-US" smtClean="0"/>
-              <a:t>3/21/17</a:t>
+              <a:t>4/4/17</a:t>
             </a:fld>
             <a:endParaRPr lang="en-US"/>
           </a:p>
@@ -2451,7 +2456,7 @@
           <a:p>
             <a:fld id="{4BAB36A4-D2A7-4048-8DB1-F0177A6C4AAA}" type="datetimeFigureOut">
               <a:rPr lang="en-US" smtClean="0"/>
-              <a:t>3/21/17</a:t>
+              <a:t>4/4/17</a:t>
             </a:fld>
             <a:endParaRPr lang="en-US"/>
           </a:p>
@@ -2704,7 +2709,7 @@
           <a:p>
             <a:fld id="{4BAB36A4-D2A7-4048-8DB1-F0177A6C4AAA}" type="datetimeFigureOut">
               <a:rPr lang="en-US" smtClean="0"/>
-              <a:t>3/21/17</a:t>
+              <a:t>4/4/17</a:t>
             </a:fld>
             <a:endParaRPr lang="en-US"/>
           </a:p>
@@ -2917,7 +2922,7 @@
           <a:p>
             <a:fld id="{4BAB36A4-D2A7-4048-8DB1-F0177A6C4AAA}" type="datetimeFigureOut">
               <a:rPr lang="en-US" smtClean="0"/>
-              <a:t>3/21/17</a:t>
+              <a:t>4/4/17</a:t>
             </a:fld>
             <a:endParaRPr lang="en-US"/>
           </a:p>

</xml_diff>